<commit_message>
Added agent diagrams to the presentation
</commit_message>
<xml_diff>
--- a/02. Langchain Agents/Langchain Agents.pptx
+++ b/02. Langchain Agents/Langchain Agents.pptx
@@ -8,7 +8,9 @@
     <p:sldId id="256" r:id="rId2"/>
     <p:sldId id="258" r:id="rId3"/>
     <p:sldId id="259" r:id="rId4"/>
-    <p:sldId id="257" r:id="rId5"/>
+    <p:sldId id="260" r:id="rId5"/>
+    <p:sldId id="261" r:id="rId6"/>
+    <p:sldId id="257" r:id="rId7"/>
   </p:sldIdLst>
   <p:sldSz cx="12192000" cy="6858000"/>
   <p:notesSz cx="6858000" cy="9144000"/>
@@ -107,13 +109,18 @@
       </a:defRPr>
     </a:lvl9pPr>
   </p:defaultTextStyle>
+  <p:extLst>
+    <p:ext uri="{EFAFB233-063F-42B5-8137-9DF3F51BA10A}">
+      <p15:sldGuideLst xmlns:p15="http://schemas.microsoft.com/office/powerpoint/2012/main"/>
+    </p:ext>
+  </p:extLst>
 </p:presentation>
 </file>
 
 <file path=ppt/revisionInfo.xml><?xml version="1.0" encoding="utf-8"?>
 <p1510:revInfo xmlns:a="http://schemas.openxmlformats.org/drawingml/2006/main" xmlns:r="http://schemas.openxmlformats.org/officeDocument/2006/relationships" xmlns:p1510="http://schemas.microsoft.com/office/powerpoint/2015/10/main">
   <p1510:revLst>
-    <p1510:client id="{809834AC-A513-431E-98F2-9EF96FE565FF}" v="59" dt="2024-07-09T08:42:57.951"/>
+    <p1510:client id="{809834AC-A513-431E-98F2-9EF96FE565FF}" v="80" dt="2024-07-11T05:29:34.580"/>
   </p1510:revLst>
 </p1510:revInfo>
 </file>
@@ -122,8 +129,8 @@
 <pc:chgInfo xmlns:a="http://schemas.openxmlformats.org/drawingml/2006/main" xmlns:r="http://schemas.openxmlformats.org/officeDocument/2006/relationships" xmlns:ac="http://schemas.microsoft.com/office/drawing/2013/main/command" xmlns:pc="http://schemas.microsoft.com/office/powerpoint/2013/main/command">
   <pc:docChgLst>
     <pc:chgData name="Sudheera Withanage" userId="ec9f026d-6b4e-4128-a84d-67054036f633" providerId="ADAL" clId="{809834AC-A513-431E-98F2-9EF96FE565FF}"/>
-    <pc:docChg chg="undo redo custSel addSld modSld modMainMaster">
-      <pc:chgData name="Sudheera Withanage" userId="ec9f026d-6b4e-4128-a84d-67054036f633" providerId="ADAL" clId="{809834AC-A513-431E-98F2-9EF96FE565FF}" dt="2024-07-09T08:45:58.148" v="315" actId="1076"/>
+    <pc:docChg chg="undo redo custSel addSld delSld modSld modMainMaster">
+      <pc:chgData name="Sudheera Withanage" userId="ec9f026d-6b4e-4128-a84d-67054036f633" providerId="ADAL" clId="{809834AC-A513-431E-98F2-9EF96FE565FF}" dt="2024-07-11T05:29:34.579" v="397" actId="1076"/>
       <pc:docMkLst>
         <pc:docMk/>
       </pc:docMkLst>
@@ -339,6 +346,145 @@
           </ac:picMkLst>
         </pc:picChg>
       </pc:sldChg>
+      <pc:sldChg chg="addSp delSp modSp add mod">
+        <pc:chgData name="Sudheera Withanage" userId="ec9f026d-6b4e-4128-a84d-67054036f633" providerId="ADAL" clId="{809834AC-A513-431E-98F2-9EF96FE565FF}" dt="2024-07-11T05:25:26.671" v="371"/>
+        <pc:sldMkLst>
+          <pc:docMk/>
+          <pc:sldMk cId="2984940549" sldId="260"/>
+        </pc:sldMkLst>
+        <pc:spChg chg="mod">
+          <ac:chgData name="Sudheera Withanage" userId="ec9f026d-6b4e-4128-a84d-67054036f633" providerId="ADAL" clId="{809834AC-A513-431E-98F2-9EF96FE565FF}" dt="2024-07-11T05:22:18.737" v="369" actId="20577"/>
+          <ac:spMkLst>
+            <pc:docMk/>
+            <pc:sldMk cId="2984940549" sldId="260"/>
+            <ac:spMk id="3" creationId="{CF332521-CA8C-DDF7-B832-47D58D93C9A9}"/>
+          </ac:spMkLst>
+        </pc:spChg>
+        <pc:spChg chg="add del mod">
+          <ac:chgData name="Sudheera Withanage" userId="ec9f026d-6b4e-4128-a84d-67054036f633" providerId="ADAL" clId="{809834AC-A513-431E-98F2-9EF96FE565FF}" dt="2024-07-11T05:25:26.671" v="371"/>
+          <ac:spMkLst>
+            <pc:docMk/>
+            <pc:sldMk cId="2984940549" sldId="260"/>
+            <ac:spMk id="4" creationId="{9C3A756F-10BC-DCF0-58FD-64E5E94C849D}"/>
+          </ac:spMkLst>
+        </pc:spChg>
+        <pc:picChg chg="del">
+          <ac:chgData name="Sudheera Withanage" userId="ec9f026d-6b4e-4128-a84d-67054036f633" providerId="ADAL" clId="{809834AC-A513-431E-98F2-9EF96FE565FF}" dt="2024-07-11T05:22:29.969" v="370" actId="478"/>
+          <ac:picMkLst>
+            <pc:docMk/>
+            <pc:sldMk cId="2984940549" sldId="260"/>
+            <ac:picMk id="10" creationId="{0DB08D2B-AA70-9E8E-3046-6C7FE4F81702}"/>
+          </ac:picMkLst>
+        </pc:picChg>
+        <pc:picChg chg="add mod">
+          <ac:chgData name="Sudheera Withanage" userId="ec9f026d-6b4e-4128-a84d-67054036f633" providerId="ADAL" clId="{809834AC-A513-431E-98F2-9EF96FE565FF}" dt="2024-07-11T05:25:26.671" v="371"/>
+          <ac:picMkLst>
+            <pc:docMk/>
+            <pc:sldMk cId="2984940549" sldId="260"/>
+            <ac:picMk id="1026" creationId="{73ACC681-2309-A725-AE04-BEE1B5DB5AD4}"/>
+          </ac:picMkLst>
+        </pc:picChg>
+      </pc:sldChg>
+      <pc:sldChg chg="new del">
+        <pc:chgData name="Sudheera Withanage" userId="ec9f026d-6b4e-4128-a84d-67054036f633" providerId="ADAL" clId="{809834AC-A513-431E-98F2-9EF96FE565FF}" dt="2024-07-11T05:21:20.629" v="318" actId="47"/>
+        <pc:sldMkLst>
+          <pc:docMk/>
+          <pc:sldMk cId="3424423357" sldId="260"/>
+        </pc:sldMkLst>
+      </pc:sldChg>
+      <pc:sldChg chg="new del">
+        <pc:chgData name="Sudheera Withanage" userId="ec9f026d-6b4e-4128-a84d-67054036f633" providerId="ADAL" clId="{809834AC-A513-431E-98F2-9EF96FE565FF}" dt="2024-07-11T05:21:22.232" v="319" actId="47"/>
+        <pc:sldMkLst>
+          <pc:docMk/>
+          <pc:sldMk cId="1012148451" sldId="261"/>
+        </pc:sldMkLst>
+      </pc:sldChg>
+      <pc:sldChg chg="addSp delSp modSp add mod">
+        <pc:chgData name="Sudheera Withanage" userId="ec9f026d-6b4e-4128-a84d-67054036f633" providerId="ADAL" clId="{809834AC-A513-431E-98F2-9EF96FE565FF}" dt="2024-07-11T05:29:34.579" v="397" actId="1076"/>
+        <pc:sldMkLst>
+          <pc:docMk/>
+          <pc:sldMk cId="3241053890" sldId="261"/>
+        </pc:sldMkLst>
+        <pc:spChg chg="mod">
+          <ac:chgData name="Sudheera Withanage" userId="ec9f026d-6b4e-4128-a84d-67054036f633" providerId="ADAL" clId="{809834AC-A513-431E-98F2-9EF96FE565FF}" dt="2024-07-11T05:26:02.368" v="378" actId="20577"/>
+          <ac:spMkLst>
+            <pc:docMk/>
+            <pc:sldMk cId="3241053890" sldId="261"/>
+            <ac:spMk id="3" creationId="{CF332521-CA8C-DDF7-B832-47D58D93C9A9}"/>
+          </ac:spMkLst>
+        </pc:spChg>
+        <pc:spChg chg="add del mod">
+          <ac:chgData name="Sudheera Withanage" userId="ec9f026d-6b4e-4128-a84d-67054036f633" providerId="ADAL" clId="{809834AC-A513-431E-98F2-9EF96FE565FF}" dt="2024-07-11T05:27:12.921" v="380" actId="3680"/>
+          <ac:spMkLst>
+            <pc:docMk/>
+            <pc:sldMk cId="3241053890" sldId="261"/>
+            <ac:spMk id="4" creationId="{9A0D8A8E-296A-69A4-29ED-2EA1D6FA693B}"/>
+          </ac:spMkLst>
+        </pc:spChg>
+        <pc:graphicFrameChg chg="add mod ord modGraphic">
+          <ac:chgData name="Sudheera Withanage" userId="ec9f026d-6b4e-4128-a84d-67054036f633" providerId="ADAL" clId="{809834AC-A513-431E-98F2-9EF96FE565FF}" dt="2024-07-11T05:27:58.744" v="388"/>
+          <ac:graphicFrameMkLst>
+            <pc:docMk/>
+            <pc:sldMk cId="3241053890" sldId="261"/>
+            <ac:graphicFrameMk id="5" creationId="{CD2E7C18-AACF-7EBF-B01F-303A2DEA66AC}"/>
+          </ac:graphicFrameMkLst>
+        </pc:graphicFrameChg>
+        <pc:picChg chg="del">
+          <ac:chgData name="Sudheera Withanage" userId="ec9f026d-6b4e-4128-a84d-67054036f633" providerId="ADAL" clId="{809834AC-A513-431E-98F2-9EF96FE565FF}" dt="2024-07-11T05:26:10.636" v="379" actId="478"/>
+          <ac:picMkLst>
+            <pc:docMk/>
+            <pc:sldMk cId="3241053890" sldId="261"/>
+            <ac:picMk id="10" creationId="{0DB08D2B-AA70-9E8E-3046-6C7FE4F81702}"/>
+          </ac:picMkLst>
+        </pc:picChg>
+        <pc:picChg chg="add mod">
+          <ac:chgData name="Sudheera Withanage" userId="ec9f026d-6b4e-4128-a84d-67054036f633" providerId="ADAL" clId="{809834AC-A513-431E-98F2-9EF96FE565FF}" dt="2024-07-11T05:29:34.579" v="397" actId="1076"/>
+          <ac:picMkLst>
+            <pc:docMk/>
+            <pc:sldMk cId="3241053890" sldId="261"/>
+            <ac:picMk id="2050" creationId="{DD247D2B-FB6D-6404-CA2A-40E2B72AB80E}"/>
+          </ac:picMkLst>
+        </pc:picChg>
+        <pc:picChg chg="add mod">
+          <ac:chgData name="Sudheera Withanage" userId="ec9f026d-6b4e-4128-a84d-67054036f633" providerId="ADAL" clId="{809834AC-A513-431E-98F2-9EF96FE565FF}" dt="2024-07-11T05:29:25.690" v="396" actId="1076"/>
+          <ac:picMkLst>
+            <pc:docMk/>
+            <pc:sldMk cId="3241053890" sldId="261"/>
+            <ac:picMk id="3074" creationId="{B06C19E7-2FB2-0F01-430C-B5B544C65373}"/>
+          </ac:picMkLst>
+        </pc:picChg>
+      </pc:sldChg>
+      <pc:sldChg chg="addSp delSp modSp new del">
+        <pc:chgData name="Sudheera Withanage" userId="ec9f026d-6b4e-4128-a84d-67054036f633" providerId="ADAL" clId="{809834AC-A513-431E-98F2-9EF96FE565FF}" dt="2024-07-11T05:28:30.264" v="394" actId="47"/>
+        <pc:sldMkLst>
+          <pc:docMk/>
+          <pc:sldMk cId="268580986" sldId="262"/>
+        </pc:sldMkLst>
+        <pc:spChg chg="del">
+          <ac:chgData name="Sudheera Withanage" userId="ec9f026d-6b4e-4128-a84d-67054036f633" providerId="ADAL" clId="{809834AC-A513-431E-98F2-9EF96FE565FF}" dt="2024-07-11T05:28:04.250" v="390"/>
+          <ac:spMkLst>
+            <pc:docMk/>
+            <pc:sldMk cId="268580986" sldId="262"/>
+            <ac:spMk id="3" creationId="{5D915447-DC88-0B5B-5B67-F00BB82206B6}"/>
+          </ac:spMkLst>
+        </pc:spChg>
+        <pc:spChg chg="add mod">
+          <ac:chgData name="Sudheera Withanage" userId="ec9f026d-6b4e-4128-a84d-67054036f633" providerId="ADAL" clId="{809834AC-A513-431E-98F2-9EF96FE565FF}" dt="2024-07-11T05:28:13.233" v="391" actId="21"/>
+          <ac:spMkLst>
+            <pc:docMk/>
+            <pc:sldMk cId="268580986" sldId="262"/>
+            <ac:spMk id="4" creationId="{3A63391F-6AB1-C465-46E0-2D1DDEA49D1B}"/>
+          </ac:spMkLst>
+        </pc:spChg>
+        <pc:picChg chg="add del mod">
+          <ac:chgData name="Sudheera Withanage" userId="ec9f026d-6b4e-4128-a84d-67054036f633" providerId="ADAL" clId="{809834AC-A513-431E-98F2-9EF96FE565FF}" dt="2024-07-11T05:28:13.233" v="391" actId="21"/>
+          <ac:picMkLst>
+            <pc:docMk/>
+            <pc:sldMk cId="268580986" sldId="262"/>
+            <ac:picMk id="2050" creationId="{DD247D2B-FB6D-6404-CA2A-40E2B72AB80E}"/>
+          </ac:picMkLst>
+        </pc:picChg>
+      </pc:sldChg>
       <pc:sldMasterChg chg="setBg modSldLayout">
         <pc:chgData name="Sudheera Withanage" userId="ec9f026d-6b4e-4128-a84d-67054036f633" providerId="ADAL" clId="{809834AC-A513-431E-98F2-9EF96FE565FF}" dt="2024-07-09T07:50:58.828" v="138"/>
         <pc:sldMasterMkLst>
@@ -588,7 +734,7 @@
           <a:p>
             <a:fld id="{D07AEF04-54AD-4684-929A-1E9C56ED90D9}" type="datetimeFigureOut">
               <a:rPr lang="en-MY" smtClean="0"/>
-              <a:t>9/7/2024</a:t>
+              <a:t>11/7/2024</a:t>
             </a:fld>
             <a:endParaRPr lang="en-MY"/>
           </a:p>
@@ -788,7 +934,7 @@
           <a:p>
             <a:fld id="{D07AEF04-54AD-4684-929A-1E9C56ED90D9}" type="datetimeFigureOut">
               <a:rPr lang="en-MY" smtClean="0"/>
-              <a:t>9/7/2024</a:t>
+              <a:t>11/7/2024</a:t>
             </a:fld>
             <a:endParaRPr lang="en-MY"/>
           </a:p>
@@ -998,7 +1144,7 @@
           <a:p>
             <a:fld id="{D07AEF04-54AD-4684-929A-1E9C56ED90D9}" type="datetimeFigureOut">
               <a:rPr lang="en-MY" smtClean="0"/>
-              <a:t>9/7/2024</a:t>
+              <a:t>11/7/2024</a:t>
             </a:fld>
             <a:endParaRPr lang="en-MY"/>
           </a:p>
@@ -1198,7 +1344,7 @@
           <a:p>
             <a:fld id="{D07AEF04-54AD-4684-929A-1E9C56ED90D9}" type="datetimeFigureOut">
               <a:rPr lang="en-MY" smtClean="0"/>
-              <a:t>9/7/2024</a:t>
+              <a:t>11/7/2024</a:t>
             </a:fld>
             <a:endParaRPr lang="en-MY"/>
           </a:p>
@@ -1474,7 +1620,7 @@
           <a:p>
             <a:fld id="{D07AEF04-54AD-4684-929A-1E9C56ED90D9}" type="datetimeFigureOut">
               <a:rPr lang="en-MY" smtClean="0"/>
-              <a:t>9/7/2024</a:t>
+              <a:t>11/7/2024</a:t>
             </a:fld>
             <a:endParaRPr lang="en-MY"/>
           </a:p>
@@ -1742,7 +1888,7 @@
           <a:p>
             <a:fld id="{D07AEF04-54AD-4684-929A-1E9C56ED90D9}" type="datetimeFigureOut">
               <a:rPr lang="en-MY" smtClean="0"/>
-              <a:t>9/7/2024</a:t>
+              <a:t>11/7/2024</a:t>
             </a:fld>
             <a:endParaRPr lang="en-MY"/>
           </a:p>
@@ -2157,7 +2303,7 @@
           <a:p>
             <a:fld id="{D07AEF04-54AD-4684-929A-1E9C56ED90D9}" type="datetimeFigureOut">
               <a:rPr lang="en-MY" smtClean="0"/>
-              <a:t>9/7/2024</a:t>
+              <a:t>11/7/2024</a:t>
             </a:fld>
             <a:endParaRPr lang="en-MY"/>
           </a:p>
@@ -2299,7 +2445,7 @@
           <a:p>
             <a:fld id="{D07AEF04-54AD-4684-929A-1E9C56ED90D9}" type="datetimeFigureOut">
               <a:rPr lang="en-MY" smtClean="0"/>
-              <a:t>9/7/2024</a:t>
+              <a:t>11/7/2024</a:t>
             </a:fld>
             <a:endParaRPr lang="en-MY"/>
           </a:p>
@@ -2412,7 +2558,7 @@
           <a:p>
             <a:fld id="{D07AEF04-54AD-4684-929A-1E9C56ED90D9}" type="datetimeFigureOut">
               <a:rPr lang="en-MY" smtClean="0"/>
-              <a:t>9/7/2024</a:t>
+              <a:t>11/7/2024</a:t>
             </a:fld>
             <a:endParaRPr lang="en-MY"/>
           </a:p>
@@ -2725,7 +2871,7 @@
           <a:p>
             <a:fld id="{D07AEF04-54AD-4684-929A-1E9C56ED90D9}" type="datetimeFigureOut">
               <a:rPr lang="en-MY" smtClean="0"/>
-              <a:t>9/7/2024</a:t>
+              <a:t>11/7/2024</a:t>
             </a:fld>
             <a:endParaRPr lang="en-MY"/>
           </a:p>
@@ -3014,7 +3160,7 @@
           <a:p>
             <a:fld id="{D07AEF04-54AD-4684-929A-1E9C56ED90D9}" type="datetimeFigureOut">
               <a:rPr lang="en-MY" smtClean="0"/>
-              <a:t>9/7/2024</a:t>
+              <a:t>11/7/2024</a:t>
             </a:fld>
             <a:endParaRPr lang="en-MY"/>
           </a:p>
@@ -3260,7 +3406,7 @@
           <a:p>
             <a:fld id="{D07AEF04-54AD-4684-929A-1E9C56ED90D9}" type="datetimeFigureOut">
               <a:rPr lang="en-MY" smtClean="0"/>
-              <a:t>9/7/2024</a:t>
+              <a:t>11/7/2024</a:t>
             </a:fld>
             <a:endParaRPr lang="en-MY"/>
           </a:p>
@@ -4520,6 +4666,421 @@
       </p:grpSpPr>
       <p:sp>
         <p:nvSpPr>
+          <p:cNvPr id="3" name="Title 2">
+            <a:extLst>
+              <a:ext uri="{FF2B5EF4-FFF2-40B4-BE49-F238E27FC236}">
+                <a16:creationId xmlns:a16="http://schemas.microsoft.com/office/drawing/2014/main" id="{CF332521-CA8C-DDF7-B832-47D58D93C9A9}"/>
+              </a:ext>
+            </a:extLst>
+          </p:cNvPr>
+          <p:cNvSpPr>
+            <a:spLocks noGrp="1"/>
+          </p:cNvSpPr>
+          <p:nvPr>
+            <p:ph type="title"/>
+          </p:nvPr>
+        </p:nvSpPr>
+        <p:spPr/>
+        <p:txBody>
+          <a:bodyPr>
+            <a:normAutofit/>
+          </a:bodyPr>
+          <a:lstStyle/>
+          <a:p>
+            <a:pPr algn="ctr"/>
+            <a:r>
+              <a:rPr lang="en-MY" sz="3600" dirty="0">
+                <a:solidFill>
+                  <a:schemeClr val="accent1">
+                    <a:lumMod val="75000"/>
+                  </a:schemeClr>
+                </a:solidFill>
+                <a:latin typeface="ADLaM Display" panose="02010000000000000000" pitchFamily="2" charset="0"/>
+                <a:ea typeface="ADLaM Display" panose="02010000000000000000" pitchFamily="2" charset="0"/>
+                <a:cs typeface="ADLaM Display" panose="02010000000000000000" pitchFamily="2" charset="0"/>
+              </a:rPr>
+              <a:t>Custom </a:t>
+            </a:r>
+            <a:r>
+              <a:rPr lang="en-MY" sz="3600" dirty="0" err="1">
+                <a:solidFill>
+                  <a:schemeClr val="accent1">
+                    <a:lumMod val="75000"/>
+                  </a:schemeClr>
+                </a:solidFill>
+                <a:latin typeface="ADLaM Display" panose="02010000000000000000" pitchFamily="2" charset="0"/>
+                <a:ea typeface="ADLaM Display" panose="02010000000000000000" pitchFamily="2" charset="0"/>
+                <a:cs typeface="ADLaM Display" panose="02010000000000000000" pitchFamily="2" charset="0"/>
+              </a:rPr>
+              <a:t>LangGraph</a:t>
+            </a:r>
+            <a:r>
+              <a:rPr lang="en-MY" sz="3600" dirty="0">
+                <a:solidFill>
+                  <a:schemeClr val="accent1">
+                    <a:lumMod val="75000"/>
+                  </a:schemeClr>
+                </a:solidFill>
+                <a:latin typeface="ADLaM Display" panose="02010000000000000000" pitchFamily="2" charset="0"/>
+                <a:ea typeface="ADLaM Display" panose="02010000000000000000" pitchFamily="2" charset="0"/>
+                <a:cs typeface="ADLaM Display" panose="02010000000000000000" pitchFamily="2" charset="0"/>
+              </a:rPr>
+              <a:t> Agents Demo</a:t>
+            </a:r>
+          </a:p>
+        </p:txBody>
+      </p:sp>
+      <p:pic>
+        <p:nvPicPr>
+          <p:cNvPr id="1026" name="Picture 2">
+            <a:extLst>
+              <a:ext uri="{FF2B5EF4-FFF2-40B4-BE49-F238E27FC236}">
+                <a16:creationId xmlns:a16="http://schemas.microsoft.com/office/drawing/2014/main" id="{73ACC681-2309-A725-AE04-BEE1B5DB5AD4}"/>
+              </a:ext>
+            </a:extLst>
+          </p:cNvPr>
+          <p:cNvPicPr>
+            <a:picLocks noGrp="1" noChangeAspect="1" noChangeArrowheads="1"/>
+          </p:cNvPicPr>
+          <p:nvPr>
+            <p:ph idx="1"/>
+          </p:nvPr>
+        </p:nvPicPr>
+        <p:blipFill>
+          <a:blip r:embed="rId2">
+            <a:extLst>
+              <a:ext uri="{28A0092B-C50C-407E-A947-70E740481C1C}">
+                <a14:useLocalDpi xmlns:a14="http://schemas.microsoft.com/office/drawing/2010/main" val="0"/>
+              </a:ext>
+            </a:extLst>
+          </a:blip>
+          <a:srcRect/>
+          <a:stretch>
+            <a:fillRect/>
+          </a:stretch>
+        </p:blipFill>
+        <p:spPr bwMode="auto">
+          <a:xfrm>
+            <a:off x="4120546" y="1825625"/>
+            <a:ext cx="3950908" cy="4351338"/>
+          </a:xfrm>
+          <a:prstGeom prst="rect">
+            <a:avLst/>
+          </a:prstGeom>
+          <a:noFill/>
+          <a:extLst>
+            <a:ext uri="{909E8E84-426E-40DD-AFC4-6F175D3DCCD1}">
+              <a14:hiddenFill xmlns:a14="http://schemas.microsoft.com/office/drawing/2010/main">
+                <a:solidFill>
+                  <a:srgbClr val="FFFFFF"/>
+                </a:solidFill>
+              </a14:hiddenFill>
+            </a:ext>
+          </a:extLst>
+        </p:spPr>
+      </p:pic>
+    </p:spTree>
+    <p:extLst>
+      <p:ext uri="{BB962C8B-B14F-4D97-AF65-F5344CB8AC3E}">
+        <p14:creationId xmlns:p14="http://schemas.microsoft.com/office/powerpoint/2010/main" val="2984940549"/>
+      </p:ext>
+    </p:extLst>
+  </p:cSld>
+  <p:clrMapOvr>
+    <a:masterClrMapping/>
+  </p:clrMapOvr>
+</p:sld>
+</file>
+
+<file path=ppt/slides/slide5.xml><?xml version="1.0" encoding="utf-8"?>
+<p:sld xmlns:a="http://schemas.openxmlformats.org/drawingml/2006/main" xmlns:r="http://schemas.openxmlformats.org/officeDocument/2006/relationships" xmlns:p="http://schemas.openxmlformats.org/presentationml/2006/main">
+  <p:cSld>
+    <p:spTree>
+      <p:nvGrpSpPr>
+        <p:cNvPr id="1" name=""/>
+        <p:cNvGrpSpPr/>
+        <p:nvPr/>
+      </p:nvGrpSpPr>
+      <p:grpSpPr>
+        <a:xfrm>
+          <a:off x="0" y="0"/>
+          <a:ext cx="0" cy="0"/>
+          <a:chOff x="0" y="0"/>
+          <a:chExt cx="0" cy="0"/>
+        </a:xfrm>
+      </p:grpSpPr>
+      <p:sp>
+        <p:nvSpPr>
+          <p:cNvPr id="3" name="Title 2">
+            <a:extLst>
+              <a:ext uri="{FF2B5EF4-FFF2-40B4-BE49-F238E27FC236}">
+                <a16:creationId xmlns:a16="http://schemas.microsoft.com/office/drawing/2014/main" id="{CF332521-CA8C-DDF7-B832-47D58D93C9A9}"/>
+              </a:ext>
+            </a:extLst>
+          </p:cNvPr>
+          <p:cNvSpPr>
+            <a:spLocks noGrp="1"/>
+          </p:cNvSpPr>
+          <p:nvPr>
+            <p:ph type="title"/>
+          </p:nvPr>
+        </p:nvSpPr>
+        <p:spPr/>
+        <p:txBody>
+          <a:bodyPr/>
+          <a:lstStyle/>
+          <a:p>
+            <a:pPr algn="ctr"/>
+            <a:r>
+              <a:rPr lang="en-MY" sz="4400" dirty="0">
+                <a:solidFill>
+                  <a:schemeClr val="accent1">
+                    <a:lumMod val="75000"/>
+                  </a:schemeClr>
+                </a:solidFill>
+                <a:latin typeface="ADLaM Display" panose="02010000000000000000" pitchFamily="2" charset="0"/>
+                <a:ea typeface="ADLaM Display" panose="02010000000000000000" pitchFamily="2" charset="0"/>
+                <a:cs typeface="ADLaM Display" panose="02010000000000000000" pitchFamily="2" charset="0"/>
+              </a:rPr>
+              <a:t>React Agents Demo</a:t>
+            </a:r>
+            <a:endParaRPr lang="en-MY" dirty="0">
+              <a:solidFill>
+                <a:schemeClr val="accent1">
+                  <a:lumMod val="75000"/>
+                </a:schemeClr>
+              </a:solidFill>
+              <a:latin typeface="ADLaM Display" panose="02010000000000000000" pitchFamily="2" charset="0"/>
+              <a:ea typeface="ADLaM Display" panose="02010000000000000000" pitchFamily="2" charset="0"/>
+              <a:cs typeface="ADLaM Display" panose="02010000000000000000" pitchFamily="2" charset="0"/>
+            </a:endParaRPr>
+          </a:p>
+        </p:txBody>
+      </p:sp>
+      <p:graphicFrame>
+        <p:nvGraphicFramePr>
+          <p:cNvPr id="5" name="Content Placeholder 4">
+            <a:extLst>
+              <a:ext uri="{FF2B5EF4-FFF2-40B4-BE49-F238E27FC236}">
+                <a16:creationId xmlns:a16="http://schemas.microsoft.com/office/drawing/2014/main" id="{CD2E7C18-AACF-7EBF-B01F-303A2DEA66AC}"/>
+              </a:ext>
+            </a:extLst>
+          </p:cNvPr>
+          <p:cNvGraphicFramePr>
+            <a:graphicFrameLocks noGrp="1"/>
+          </p:cNvGraphicFramePr>
+          <p:nvPr>
+            <p:ph idx="1"/>
+            <p:extLst>
+              <p:ext uri="{D42A27DB-BD31-4B8C-83A1-F6EECF244321}">
+                <p14:modId xmlns:p14="http://schemas.microsoft.com/office/powerpoint/2010/main" val="2150488380"/>
+              </p:ext>
+            </p:extLst>
+          </p:nvPr>
+        </p:nvGraphicFramePr>
+        <p:xfrm>
+          <a:off x="838200" y="1825624"/>
+          <a:ext cx="10515600" cy="4410583"/>
+        </p:xfrm>
+        <a:graphic>
+          <a:graphicData uri="http://schemas.openxmlformats.org/drawingml/2006/table">
+            <a:tbl>
+              <a:tblPr firstRow="1" bandRow="1">
+                <a:tableStyleId>{2D5ABB26-0587-4C30-8999-92F81FD0307C}</a:tableStyleId>
+              </a:tblPr>
+              <a:tblGrid>
+                <a:gridCol w="5257800">
+                  <a:extLst>
+                    <a:ext uri="{9D8B030D-6E8A-4147-A177-3AD203B41FA5}">
+                      <a16:colId xmlns:a16="http://schemas.microsoft.com/office/drawing/2014/main" val="1503485628"/>
+                    </a:ext>
+                  </a:extLst>
+                </a:gridCol>
+                <a:gridCol w="5257800">
+                  <a:extLst>
+                    <a:ext uri="{9D8B030D-6E8A-4147-A177-3AD203B41FA5}">
+                      <a16:colId xmlns:a16="http://schemas.microsoft.com/office/drawing/2014/main" val="3824001450"/>
+                    </a:ext>
+                  </a:extLst>
+                </a:gridCol>
+              </a:tblGrid>
+              <a:tr h="4410583">
+                <a:tc>
+                  <a:txBody>
+                    <a:bodyPr/>
+                    <a:lstStyle/>
+                    <a:p>
+                      <a:endParaRPr lang="en-MY" dirty="0"/>
+                    </a:p>
+                  </a:txBody>
+                  <a:tcPr>
+                    <a:lnR w="12700" cap="flat" cmpd="sng" algn="ctr">
+                      <a:solidFill>
+                        <a:schemeClr val="tx1"/>
+                      </a:solidFill>
+                      <a:prstDash val="solid"/>
+                      <a:round/>
+                      <a:headEnd type="none" w="med" len="med"/>
+                      <a:tailEnd type="none" w="med" len="med"/>
+                    </a:lnR>
+                  </a:tcPr>
+                </a:tc>
+                <a:tc>
+                  <a:txBody>
+                    <a:bodyPr/>
+                    <a:lstStyle/>
+                    <a:p>
+                      <a:endParaRPr lang="en-MY" dirty="0"/>
+                    </a:p>
+                  </a:txBody>
+                  <a:tcPr>
+                    <a:lnL w="12700" cap="flat" cmpd="sng" algn="ctr">
+                      <a:solidFill>
+                        <a:schemeClr val="tx1"/>
+                      </a:solidFill>
+                      <a:prstDash val="solid"/>
+                      <a:round/>
+                      <a:headEnd type="none" w="med" len="med"/>
+                      <a:tailEnd type="none" w="med" len="med"/>
+                    </a:lnL>
+                  </a:tcPr>
+                </a:tc>
+                <a:extLst>
+                  <a:ext uri="{0D108BD9-81ED-4DB2-BD59-A6C34878D82A}">
+                    <a16:rowId xmlns:a16="http://schemas.microsoft.com/office/drawing/2014/main" val="1127209621"/>
+                  </a:ext>
+                </a:extLst>
+              </a:tr>
+            </a:tbl>
+          </a:graphicData>
+        </a:graphic>
+      </p:graphicFrame>
+      <p:pic>
+        <p:nvPicPr>
+          <p:cNvPr id="2050" name="Picture 2">
+            <a:extLst>
+              <a:ext uri="{FF2B5EF4-FFF2-40B4-BE49-F238E27FC236}">
+                <a16:creationId xmlns:a16="http://schemas.microsoft.com/office/drawing/2014/main" id="{DD247D2B-FB6D-6404-CA2A-40E2B72AB80E}"/>
+              </a:ext>
+            </a:extLst>
+          </p:cNvPr>
+          <p:cNvPicPr>
+            <a:picLocks noChangeAspect="1" noChangeArrowheads="1"/>
+          </p:cNvPicPr>
+          <p:nvPr/>
+        </p:nvPicPr>
+        <p:blipFill>
+          <a:blip r:embed="rId2">
+            <a:extLst>
+              <a:ext uri="{28A0092B-C50C-407E-A947-70E740481C1C}">
+                <a14:useLocalDpi xmlns:a14="http://schemas.microsoft.com/office/drawing/2010/main" val="0"/>
+              </a:ext>
+            </a:extLst>
+          </a:blip>
+          <a:srcRect/>
+          <a:stretch>
+            <a:fillRect/>
+          </a:stretch>
+        </p:blipFill>
+        <p:spPr bwMode="auto">
+          <a:xfrm>
+            <a:off x="1562101" y="2592640"/>
+            <a:ext cx="4076700" cy="2876550"/>
+          </a:xfrm>
+          <a:prstGeom prst="rect">
+            <a:avLst/>
+          </a:prstGeom>
+          <a:noFill/>
+          <a:extLst>
+            <a:ext uri="{909E8E84-426E-40DD-AFC4-6F175D3DCCD1}">
+              <a14:hiddenFill xmlns:a14="http://schemas.microsoft.com/office/drawing/2010/main">
+                <a:solidFill>
+                  <a:srgbClr val="FFFFFF"/>
+                </a:solidFill>
+              </a14:hiddenFill>
+            </a:ext>
+          </a:extLst>
+        </p:spPr>
+      </p:pic>
+      <p:pic>
+        <p:nvPicPr>
+          <p:cNvPr id="3074" name="Picture 2">
+            <a:extLst>
+              <a:ext uri="{FF2B5EF4-FFF2-40B4-BE49-F238E27FC236}">
+                <a16:creationId xmlns:a16="http://schemas.microsoft.com/office/drawing/2014/main" id="{B06C19E7-2FB2-0F01-430C-B5B544C65373}"/>
+              </a:ext>
+            </a:extLst>
+          </p:cNvPr>
+          <p:cNvPicPr>
+            <a:picLocks noChangeAspect="1" noChangeArrowheads="1"/>
+          </p:cNvPicPr>
+          <p:nvPr/>
+        </p:nvPicPr>
+        <p:blipFill>
+          <a:blip r:embed="rId3">
+            <a:extLst>
+              <a:ext uri="{28A0092B-C50C-407E-A947-70E740481C1C}">
+                <a14:useLocalDpi xmlns:a14="http://schemas.microsoft.com/office/drawing/2010/main" val="0"/>
+              </a:ext>
+            </a:extLst>
+          </a:blip>
+          <a:srcRect/>
+          <a:stretch>
+            <a:fillRect/>
+          </a:stretch>
+        </p:blipFill>
+        <p:spPr bwMode="auto">
+          <a:xfrm>
+            <a:off x="6553200" y="2592640"/>
+            <a:ext cx="4800600" cy="2876550"/>
+          </a:xfrm>
+          <a:prstGeom prst="rect">
+            <a:avLst/>
+          </a:prstGeom>
+          <a:noFill/>
+          <a:extLst>
+            <a:ext uri="{909E8E84-426E-40DD-AFC4-6F175D3DCCD1}">
+              <a14:hiddenFill xmlns:a14="http://schemas.microsoft.com/office/drawing/2010/main">
+                <a:solidFill>
+                  <a:srgbClr val="FFFFFF"/>
+                </a:solidFill>
+              </a14:hiddenFill>
+            </a:ext>
+          </a:extLst>
+        </p:spPr>
+      </p:pic>
+    </p:spTree>
+    <p:extLst>
+      <p:ext uri="{BB962C8B-B14F-4D97-AF65-F5344CB8AC3E}">
+        <p14:creationId xmlns:p14="http://schemas.microsoft.com/office/powerpoint/2010/main" val="3241053890"/>
+      </p:ext>
+    </p:extLst>
+  </p:cSld>
+  <p:clrMapOvr>
+    <a:masterClrMapping/>
+  </p:clrMapOvr>
+</p:sld>
+</file>
+
+<file path=ppt/slides/slide6.xml><?xml version="1.0" encoding="utf-8"?>
+<p:sld xmlns:a="http://schemas.openxmlformats.org/drawingml/2006/main" xmlns:r="http://schemas.openxmlformats.org/officeDocument/2006/relationships" xmlns:p="http://schemas.openxmlformats.org/presentationml/2006/main">
+  <p:cSld>
+    <p:spTree>
+      <p:nvGrpSpPr>
+        <p:cNvPr id="1" name=""/>
+        <p:cNvGrpSpPr/>
+        <p:nvPr/>
+      </p:nvGrpSpPr>
+      <p:grpSpPr>
+        <a:xfrm>
+          <a:off x="0" y="0"/>
+          <a:ext cx="0" cy="0"/>
+          <a:chOff x="0" y="0"/>
+          <a:chExt cx="0" cy="0"/>
+        </a:xfrm>
+      </p:grpSpPr>
+      <p:sp>
+        <p:nvSpPr>
           <p:cNvPr id="2" name="Title 1">
             <a:extLst>
               <a:ext uri="{FF2B5EF4-FFF2-40B4-BE49-F238E27FC236}">

</xml_diff>